<commit_message>
tugas kelompok nambahin npm
</commit_message>
<xml_diff>
--- a/Tugas 3/Kelompok 4.pptx
+++ b/Tugas 3/Kelompok 4.pptx
@@ -3916,6 +3916,13 @@
               </a:rPr>
               <a:t>Fahriza</a:t>
             </a:r>
+            <a:r>
+              <a:rPr lang="en-US" sz="1800" dirty="0">
+                <a:latin typeface="Arial" panose="020B0604020202020204" pitchFamily="34" charset="0"/>
+                <a:cs typeface="Arial" panose="020B0604020202020204" pitchFamily="34" charset="0"/>
+              </a:rPr>
+              <a:t> - 54415678</a:t>
+            </a:r>
             <a:endParaRPr lang="en-US" sz="1800" dirty="0" smtClean="0">
               <a:latin typeface="Arial" panose="020B0604020202020204" pitchFamily="34" charset="0"/>
               <a:cs typeface="Arial" panose="020B0604020202020204" pitchFamily="34" charset="0"/>
@@ -3946,6 +3953,20 @@
               </a:rPr>
               <a:t>Satria</a:t>
             </a:r>
+            <a:r>
+              <a:rPr lang="en-US" sz="1800" dirty="0" smtClean="0">
+                <a:latin typeface="Arial" panose="020B0604020202020204" pitchFamily="34" charset="0"/>
+                <a:cs typeface="Arial" panose="020B0604020202020204" pitchFamily="34" charset="0"/>
+              </a:rPr>
+              <a:t> </a:t>
+            </a:r>
+            <a:r>
+              <a:rPr lang="en-US" sz="1800" dirty="0">
+                <a:latin typeface="Arial" panose="020B0604020202020204" pitchFamily="34" charset="0"/>
+                <a:cs typeface="Arial" panose="020B0604020202020204" pitchFamily="34" charset="0"/>
+              </a:rPr>
+              <a:t>- 56415570</a:t>
+            </a:r>
             <a:endParaRPr lang="en-US" sz="1800" dirty="0" smtClean="0">
               <a:latin typeface="Arial" panose="020B0604020202020204" pitchFamily="34" charset="0"/>
               <a:cs typeface="Arial" panose="020B0604020202020204" pitchFamily="34" charset="0"/>
@@ -3956,11 +3977,18 @@
               <a:buNone/>
             </a:pPr>
             <a:r>
-              <a:rPr lang="en-US" sz="1800" dirty="0" smtClean="0">
-                <a:latin typeface="Arial" panose="020B0604020202020204" pitchFamily="34" charset="0"/>
-                <a:cs typeface="Arial" panose="020B0604020202020204" pitchFamily="34" charset="0"/>
-              </a:rPr>
-              <a:t>Yudha Patria</a:t>
+              <a:rPr lang="en-US" sz="1800" smtClean="0">
+                <a:latin typeface="Arial" panose="020B0604020202020204" pitchFamily="34" charset="0"/>
+                <a:cs typeface="Arial" panose="020B0604020202020204" pitchFamily="34" charset="0"/>
+              </a:rPr>
+              <a:t>Yudha </a:t>
+            </a:r>
+            <a:r>
+              <a:rPr lang="en-US" sz="1800" smtClean="0">
+                <a:latin typeface="Arial" panose="020B0604020202020204" pitchFamily="34" charset="0"/>
+                <a:cs typeface="Arial" panose="020B0604020202020204" pitchFamily="34" charset="0"/>
+              </a:rPr>
+              <a:t>Patria - 57415312</a:t>
             </a:r>
             <a:endParaRPr lang="en-US" sz="1800" dirty="0">
               <a:latin typeface="Arial" panose="020B0604020202020204" pitchFamily="34" charset="0"/>

</xml_diff>